<commit_message>
refactor scoring tables & continue exploration on sgc3a
</commit_message>
<xml_diff>
--- a/ANALYSIS/MAIN/analysis/SGC3A/static/keys/_learn_121.pptx
+++ b/ANALYSIS/MAIN/analysis/SGC3A/static/keys/_learn_121.pptx
@@ -285,7 +285,7 @@
           <a:p>
             <a:fld id="{53779F68-5F10-A14E-84A0-800094737C2F}" type="datetimeFigureOut">
               <a:rPr lang="en-US" smtClean="0"/>
-              <a:t>5/13/22</a:t>
+              <a:t>5/18/22</a:t>
             </a:fld>
             <a:endParaRPr lang="en-US"/>
           </a:p>
@@ -483,7 +483,7 @@
           <a:p>
             <a:fld id="{53779F68-5F10-A14E-84A0-800094737C2F}" type="datetimeFigureOut">
               <a:rPr lang="en-US" smtClean="0"/>
-              <a:t>5/13/22</a:t>
+              <a:t>5/18/22</a:t>
             </a:fld>
             <a:endParaRPr lang="en-US"/>
           </a:p>
@@ -691,7 +691,7 @@
           <a:p>
             <a:fld id="{53779F68-5F10-A14E-84A0-800094737C2F}" type="datetimeFigureOut">
               <a:rPr lang="en-US" smtClean="0"/>
-              <a:t>5/13/22</a:t>
+              <a:t>5/18/22</a:t>
             </a:fld>
             <a:endParaRPr lang="en-US"/>
           </a:p>
@@ -889,7 +889,7 @@
           <a:p>
             <a:fld id="{53779F68-5F10-A14E-84A0-800094737C2F}" type="datetimeFigureOut">
               <a:rPr lang="en-US" smtClean="0"/>
-              <a:t>5/13/22</a:t>
+              <a:t>5/18/22</a:t>
             </a:fld>
             <a:endParaRPr lang="en-US"/>
           </a:p>
@@ -1164,7 +1164,7 @@
           <a:p>
             <a:fld id="{53779F68-5F10-A14E-84A0-800094737C2F}" type="datetimeFigureOut">
               <a:rPr lang="en-US" smtClean="0"/>
-              <a:t>5/13/22</a:t>
+              <a:t>5/18/22</a:t>
             </a:fld>
             <a:endParaRPr lang="en-US"/>
           </a:p>
@@ -1429,7 +1429,7 @@
           <a:p>
             <a:fld id="{53779F68-5F10-A14E-84A0-800094737C2F}" type="datetimeFigureOut">
               <a:rPr lang="en-US" smtClean="0"/>
-              <a:t>5/13/22</a:t>
+              <a:t>5/18/22</a:t>
             </a:fld>
             <a:endParaRPr lang="en-US"/>
           </a:p>
@@ -1841,7 +1841,7 @@
           <a:p>
             <a:fld id="{53779F68-5F10-A14E-84A0-800094737C2F}" type="datetimeFigureOut">
               <a:rPr lang="en-US" smtClean="0"/>
-              <a:t>5/13/22</a:t>
+              <a:t>5/18/22</a:t>
             </a:fld>
             <a:endParaRPr lang="en-US"/>
           </a:p>
@@ -1982,7 +1982,7 @@
           <a:p>
             <a:fld id="{53779F68-5F10-A14E-84A0-800094737C2F}" type="datetimeFigureOut">
               <a:rPr lang="en-US" smtClean="0"/>
-              <a:t>5/13/22</a:t>
+              <a:t>5/18/22</a:t>
             </a:fld>
             <a:endParaRPr lang="en-US"/>
           </a:p>
@@ -2095,7 +2095,7 @@
           <a:p>
             <a:fld id="{53779F68-5F10-A14E-84A0-800094737C2F}" type="datetimeFigureOut">
               <a:rPr lang="en-US" smtClean="0"/>
-              <a:t>5/13/22</a:t>
+              <a:t>5/18/22</a:t>
             </a:fld>
             <a:endParaRPr lang="en-US"/>
           </a:p>
@@ -2406,7 +2406,7 @@
           <a:p>
             <a:fld id="{53779F68-5F10-A14E-84A0-800094737C2F}" type="datetimeFigureOut">
               <a:rPr lang="en-US" smtClean="0"/>
-              <a:t>5/13/22</a:t>
+              <a:t>5/18/22</a:t>
             </a:fld>
             <a:endParaRPr lang="en-US"/>
           </a:p>
@@ -2694,7 +2694,7 @@
           <a:p>
             <a:fld id="{53779F68-5F10-A14E-84A0-800094737C2F}" type="datetimeFigureOut">
               <a:rPr lang="en-US" smtClean="0"/>
-              <a:t>5/13/22</a:t>
+              <a:t>5/18/22</a:t>
             </a:fld>
             <a:endParaRPr lang="en-US"/>
           </a:p>
@@ -2935,7 +2935,7 @@
           <a:p>
             <a:fld id="{53779F68-5F10-A14E-84A0-800094737C2F}" type="datetimeFigureOut">
               <a:rPr lang="en-US" smtClean="0"/>
-              <a:t>5/13/22</a:t>
+              <a:t>5/18/22</a:t>
             </a:fld>
             <a:endParaRPr lang="en-US"/>
           </a:p>
@@ -10144,6 +10144,367 @@
           </a:fontRef>
         </p:style>
       </p:cxnSp>
+      <p:pic>
+        <p:nvPicPr>
+          <p:cNvPr id="18" name="Picture 17">
+            <a:extLst>
+              <a:ext uri="{FF2B5EF4-FFF2-40B4-BE49-F238E27FC236}">
+                <a16:creationId xmlns:a16="http://schemas.microsoft.com/office/drawing/2014/main" id="{2AF8C721-849D-EB0A-CF0B-6AA8958BE9B0}"/>
+              </a:ext>
+            </a:extLst>
+          </p:cNvPr>
+          <p:cNvPicPr>
+            <a:picLocks noChangeAspect="1"/>
+          </p:cNvPicPr>
+          <p:nvPr/>
+        </p:nvPicPr>
+        <p:blipFill rotWithShape="1">
+          <a:blip r:embed="rId2"/>
+          <a:srcRect l="56029" t="24706" r="16048" b="24438"/>
+          <a:stretch/>
+        </p:blipFill>
+        <p:spPr>
+          <a:xfrm>
+            <a:off x="5604317" y="3454544"/>
+            <a:ext cx="3207266" cy="3285802"/>
+          </a:xfrm>
+          <a:prstGeom prst="rect">
+            <a:avLst/>
+          </a:prstGeom>
+        </p:spPr>
+      </p:pic>
+      <p:cxnSp>
+        <p:nvCxnSpPr>
+          <p:cNvPr id="20" name="Straight Arrow Connector 19">
+            <a:extLst>
+              <a:ext uri="{FF2B5EF4-FFF2-40B4-BE49-F238E27FC236}">
+                <a16:creationId xmlns:a16="http://schemas.microsoft.com/office/drawing/2014/main" id="{B986F360-0D21-05BE-94CA-2E088B605895}"/>
+              </a:ext>
+            </a:extLst>
+          </p:cNvPr>
+          <p:cNvCxnSpPr>
+            <a:cxnSpLocks/>
+          </p:cNvCxnSpPr>
+          <p:nvPr/>
+        </p:nvCxnSpPr>
+        <p:spPr>
+          <a:xfrm flipH="1" flipV="1">
+            <a:off x="5972393" y="5075424"/>
+            <a:ext cx="627574" cy="1286525"/>
+          </a:xfrm>
+          <a:prstGeom prst="straightConnector1">
+            <a:avLst/>
+          </a:prstGeom>
+          <a:ln w="12700">
+            <a:solidFill>
+              <a:schemeClr val="accent4"/>
+            </a:solidFill>
+            <a:prstDash val="dash"/>
+            <a:tailEnd type="triangle"/>
+          </a:ln>
+        </p:spPr>
+        <p:style>
+          <a:lnRef idx="1">
+            <a:schemeClr val="accent1"/>
+          </a:lnRef>
+          <a:fillRef idx="0">
+            <a:schemeClr val="accent1"/>
+          </a:fillRef>
+          <a:effectRef idx="0">
+            <a:schemeClr val="accent1"/>
+          </a:effectRef>
+          <a:fontRef idx="minor">
+            <a:schemeClr val="tx1"/>
+          </a:fontRef>
+        </p:style>
+      </p:cxnSp>
+      <p:sp>
+        <p:nvSpPr>
+          <p:cNvPr id="21" name="Oval 20">
+            <a:extLst>
+              <a:ext uri="{FF2B5EF4-FFF2-40B4-BE49-F238E27FC236}">
+                <a16:creationId xmlns:a16="http://schemas.microsoft.com/office/drawing/2014/main" id="{A7420A16-B772-7A38-4368-AFC9F4C271D4}"/>
+              </a:ext>
+            </a:extLst>
+          </p:cNvPr>
+          <p:cNvSpPr/>
+          <p:nvPr/>
+        </p:nvSpPr>
+        <p:spPr>
+          <a:xfrm>
+            <a:off x="6262242" y="5793959"/>
+            <a:ext cx="238137" cy="238137"/>
+          </a:xfrm>
+          <a:prstGeom prst="ellipse">
+            <a:avLst/>
+          </a:prstGeom>
+          <a:solidFill>
+            <a:schemeClr val="accent4">
+              <a:alpha val="25000"/>
+            </a:schemeClr>
+          </a:solidFill>
+          <a:ln>
+            <a:solidFill>
+              <a:schemeClr val="accent4"/>
+            </a:solidFill>
+          </a:ln>
+        </p:spPr>
+        <p:style>
+          <a:lnRef idx="2">
+            <a:schemeClr val="accent1">
+              <a:shade val="50000"/>
+            </a:schemeClr>
+          </a:lnRef>
+          <a:fillRef idx="1">
+            <a:schemeClr val="accent1"/>
+          </a:fillRef>
+          <a:effectRef idx="0">
+            <a:schemeClr val="accent1"/>
+          </a:effectRef>
+          <a:fontRef idx="minor">
+            <a:schemeClr val="lt1"/>
+          </a:fontRef>
+        </p:style>
+        <p:txBody>
+          <a:bodyPr rtlCol="0" anchor="ctr"/>
+          <a:lstStyle/>
+          <a:p>
+            <a:pPr algn="ctr"/>
+            <a:endParaRPr lang="en-US"/>
+          </a:p>
+        </p:txBody>
+      </p:sp>
+      <p:pic>
+        <p:nvPicPr>
+          <p:cNvPr id="24" name="Picture 23">
+            <a:extLst>
+              <a:ext uri="{FF2B5EF4-FFF2-40B4-BE49-F238E27FC236}">
+                <a16:creationId xmlns:a16="http://schemas.microsoft.com/office/drawing/2014/main" id="{CF998B1A-29AB-1E6B-6042-481DA0B1E505}"/>
+              </a:ext>
+            </a:extLst>
+          </p:cNvPr>
+          <p:cNvPicPr>
+            <a:picLocks noChangeAspect="1"/>
+          </p:cNvPicPr>
+          <p:nvPr/>
+        </p:nvPicPr>
+        <p:blipFill rotWithShape="1">
+          <a:blip r:embed="rId2"/>
+          <a:srcRect l="56029" t="24706" r="16048" b="24438"/>
+          <a:stretch/>
+        </p:blipFill>
+        <p:spPr>
+          <a:xfrm>
+            <a:off x="5563895" y="292405"/>
+            <a:ext cx="3207266" cy="3285802"/>
+          </a:xfrm>
+          <a:prstGeom prst="rect">
+            <a:avLst/>
+          </a:prstGeom>
+        </p:spPr>
+      </p:pic>
+      <p:cxnSp>
+        <p:nvCxnSpPr>
+          <p:cNvPr id="26" name="Straight Arrow Connector 25">
+            <a:extLst>
+              <a:ext uri="{FF2B5EF4-FFF2-40B4-BE49-F238E27FC236}">
+                <a16:creationId xmlns:a16="http://schemas.microsoft.com/office/drawing/2014/main" id="{BBFDBBF9-F62F-A618-1EB8-2D3EC87DE402}"/>
+              </a:ext>
+            </a:extLst>
+          </p:cNvPr>
+          <p:cNvCxnSpPr>
+            <a:cxnSpLocks/>
+          </p:cNvCxnSpPr>
+          <p:nvPr/>
+        </p:nvCxnSpPr>
+        <p:spPr>
+          <a:xfrm flipH="1" flipV="1">
+            <a:off x="5931971" y="1913285"/>
+            <a:ext cx="627574" cy="1286525"/>
+          </a:xfrm>
+          <a:prstGeom prst="straightConnector1">
+            <a:avLst/>
+          </a:prstGeom>
+          <a:ln w="12700">
+            <a:solidFill>
+              <a:schemeClr val="accent4"/>
+            </a:solidFill>
+            <a:prstDash val="dash"/>
+            <a:tailEnd type="triangle"/>
+          </a:ln>
+        </p:spPr>
+        <p:style>
+          <a:lnRef idx="1">
+            <a:schemeClr val="accent1"/>
+          </a:lnRef>
+          <a:fillRef idx="0">
+            <a:schemeClr val="accent1"/>
+          </a:fillRef>
+          <a:effectRef idx="0">
+            <a:schemeClr val="accent1"/>
+          </a:effectRef>
+          <a:fontRef idx="minor">
+            <a:schemeClr val="tx1"/>
+          </a:fontRef>
+        </p:style>
+      </p:cxnSp>
+      <p:sp>
+        <p:nvSpPr>
+          <p:cNvPr id="38" name="Oval 37">
+            <a:extLst>
+              <a:ext uri="{FF2B5EF4-FFF2-40B4-BE49-F238E27FC236}">
+                <a16:creationId xmlns:a16="http://schemas.microsoft.com/office/drawing/2014/main" id="{EB515C7C-C4BF-2ED3-A7CA-F397AC750807}"/>
+              </a:ext>
+            </a:extLst>
+          </p:cNvPr>
+          <p:cNvSpPr/>
+          <p:nvPr/>
+        </p:nvSpPr>
+        <p:spPr>
+          <a:xfrm>
+            <a:off x="6221820" y="2631820"/>
+            <a:ext cx="238137" cy="238137"/>
+          </a:xfrm>
+          <a:prstGeom prst="ellipse">
+            <a:avLst/>
+          </a:prstGeom>
+          <a:solidFill>
+            <a:schemeClr val="accent4">
+              <a:alpha val="25000"/>
+            </a:schemeClr>
+          </a:solidFill>
+          <a:ln>
+            <a:solidFill>
+              <a:schemeClr val="accent4"/>
+            </a:solidFill>
+          </a:ln>
+        </p:spPr>
+        <p:style>
+          <a:lnRef idx="2">
+            <a:schemeClr val="accent1">
+              <a:shade val="50000"/>
+            </a:schemeClr>
+          </a:lnRef>
+          <a:fillRef idx="1">
+            <a:schemeClr val="accent1"/>
+          </a:fillRef>
+          <a:effectRef idx="0">
+            <a:schemeClr val="accent1"/>
+          </a:effectRef>
+          <a:fontRef idx="minor">
+            <a:schemeClr val="lt1"/>
+          </a:fontRef>
+        </p:style>
+        <p:txBody>
+          <a:bodyPr rtlCol="0" anchor="ctr"/>
+          <a:lstStyle/>
+          <a:p>
+            <a:pPr algn="ctr"/>
+            <a:endParaRPr lang="en-US"/>
+          </a:p>
+        </p:txBody>
+      </p:sp>
+      <p:sp>
+        <p:nvSpPr>
+          <p:cNvPr id="39" name="Oval 38">
+            <a:extLst>
+              <a:ext uri="{FF2B5EF4-FFF2-40B4-BE49-F238E27FC236}">
+                <a16:creationId xmlns:a16="http://schemas.microsoft.com/office/drawing/2014/main" id="{45C6B3F9-CEC0-048A-EF1D-03FC4F79CE57}"/>
+              </a:ext>
+            </a:extLst>
+          </p:cNvPr>
+          <p:cNvSpPr/>
+          <p:nvPr/>
+        </p:nvSpPr>
+        <p:spPr>
+          <a:xfrm>
+            <a:off x="6335087" y="1962550"/>
+            <a:ext cx="238137" cy="238137"/>
+          </a:xfrm>
+          <a:prstGeom prst="ellipse">
+            <a:avLst/>
+          </a:prstGeom>
+          <a:solidFill>
+            <a:schemeClr val="accent2">
+              <a:alpha val="25000"/>
+            </a:schemeClr>
+          </a:solidFill>
+          <a:ln>
+            <a:solidFill>
+              <a:schemeClr val="accent2"/>
+            </a:solidFill>
+          </a:ln>
+        </p:spPr>
+        <p:style>
+          <a:lnRef idx="2">
+            <a:schemeClr val="accent1">
+              <a:shade val="50000"/>
+            </a:schemeClr>
+          </a:lnRef>
+          <a:fillRef idx="1">
+            <a:schemeClr val="accent1"/>
+          </a:fillRef>
+          <a:effectRef idx="0">
+            <a:schemeClr val="accent1"/>
+          </a:effectRef>
+          <a:fontRef idx="minor">
+            <a:schemeClr val="lt1"/>
+          </a:fontRef>
+        </p:style>
+        <p:txBody>
+          <a:bodyPr rtlCol="0" anchor="ctr"/>
+          <a:lstStyle/>
+          <a:p>
+            <a:pPr algn="ctr"/>
+            <a:endParaRPr lang="en-US"/>
+          </a:p>
+        </p:txBody>
+      </p:sp>
+      <p:cxnSp>
+        <p:nvCxnSpPr>
+          <p:cNvPr id="40" name="Straight Arrow Connector 39">
+            <a:extLst>
+              <a:ext uri="{FF2B5EF4-FFF2-40B4-BE49-F238E27FC236}">
+                <a16:creationId xmlns:a16="http://schemas.microsoft.com/office/drawing/2014/main" id="{9C1E3C1F-DD54-7CA3-0A05-D1032911F9ED}"/>
+              </a:ext>
+            </a:extLst>
+          </p:cNvPr>
+          <p:cNvCxnSpPr>
+            <a:cxnSpLocks/>
+          </p:cNvCxnSpPr>
+          <p:nvPr/>
+        </p:nvCxnSpPr>
+        <p:spPr>
+          <a:xfrm flipH="1" flipV="1">
+            <a:off x="6286180" y="496051"/>
+            <a:ext cx="273365" cy="2703759"/>
+          </a:xfrm>
+          <a:prstGeom prst="straightConnector1">
+            <a:avLst/>
+          </a:prstGeom>
+          <a:ln w="12700">
+            <a:solidFill>
+              <a:schemeClr val="accent2"/>
+            </a:solidFill>
+            <a:prstDash val="dash"/>
+            <a:tailEnd type="triangle"/>
+          </a:ln>
+        </p:spPr>
+        <p:style>
+          <a:lnRef idx="1">
+            <a:schemeClr val="accent1"/>
+          </a:lnRef>
+          <a:fillRef idx="0">
+            <a:schemeClr val="accent1"/>
+          </a:fillRef>
+          <a:effectRef idx="0">
+            <a:schemeClr val="accent1"/>
+          </a:effectRef>
+          <a:fontRef idx="minor">
+            <a:schemeClr val="tx1"/>
+          </a:fontRef>
+        </p:style>
+      </p:cxnSp>
     </p:spTree>
     <p:extLst>
       <p:ext uri="{BB962C8B-B14F-4D97-AF65-F5344CB8AC3E}">
@@ -10280,6 +10641,237 @@
           <a:chExt cx="0" cy="0"/>
         </a:xfrm>
       </p:grpSpPr>
+      <p:pic>
+        <p:nvPicPr>
+          <p:cNvPr id="2" name="Picture 1">
+            <a:extLst>
+              <a:ext uri="{FF2B5EF4-FFF2-40B4-BE49-F238E27FC236}">
+                <a16:creationId xmlns:a16="http://schemas.microsoft.com/office/drawing/2014/main" id="{557CCCD4-3057-9968-D669-AB41C2A156A8}"/>
+              </a:ext>
+            </a:extLst>
+          </p:cNvPr>
+          <p:cNvPicPr>
+            <a:picLocks noChangeAspect="1"/>
+          </p:cNvPicPr>
+          <p:nvPr/>
+        </p:nvPicPr>
+        <p:blipFill rotWithShape="1">
+          <a:blip r:embed="rId2"/>
+          <a:srcRect l="56029" t="24706" r="16048" b="24438"/>
+          <a:stretch/>
+        </p:blipFill>
+        <p:spPr>
+          <a:xfrm>
+            <a:off x="253997" y="3389008"/>
+            <a:ext cx="3207266" cy="3285802"/>
+          </a:xfrm>
+          <a:prstGeom prst="rect">
+            <a:avLst/>
+          </a:prstGeom>
+        </p:spPr>
+      </p:pic>
+      <p:sp>
+        <p:nvSpPr>
+          <p:cNvPr id="3" name="Oval 2">
+            <a:extLst>
+              <a:ext uri="{FF2B5EF4-FFF2-40B4-BE49-F238E27FC236}">
+                <a16:creationId xmlns:a16="http://schemas.microsoft.com/office/drawing/2014/main" id="{0ADC29DF-BF37-4597-FBED-23D0015558F7}"/>
+              </a:ext>
+            </a:extLst>
+          </p:cNvPr>
+          <p:cNvSpPr/>
+          <p:nvPr/>
+        </p:nvSpPr>
+        <p:spPr>
+          <a:xfrm>
+            <a:off x="2470230" y="4812189"/>
+            <a:ext cx="238137" cy="238137"/>
+          </a:xfrm>
+          <a:prstGeom prst="ellipse">
+            <a:avLst/>
+          </a:prstGeom>
+          <a:solidFill>
+            <a:schemeClr val="accent2">
+              <a:alpha val="25000"/>
+            </a:schemeClr>
+          </a:solidFill>
+          <a:ln>
+            <a:solidFill>
+              <a:schemeClr val="accent2"/>
+            </a:solidFill>
+          </a:ln>
+        </p:spPr>
+        <p:style>
+          <a:lnRef idx="2">
+            <a:schemeClr val="accent1">
+              <a:shade val="50000"/>
+            </a:schemeClr>
+          </a:lnRef>
+          <a:fillRef idx="1">
+            <a:schemeClr val="accent1"/>
+          </a:fillRef>
+          <a:effectRef idx="0">
+            <a:schemeClr val="accent1"/>
+          </a:effectRef>
+          <a:fontRef idx="minor">
+            <a:schemeClr val="lt1"/>
+          </a:fontRef>
+        </p:style>
+        <p:txBody>
+          <a:bodyPr rtlCol="0" anchor="ctr"/>
+          <a:lstStyle/>
+          <a:p>
+            <a:pPr algn="ctr"/>
+            <a:endParaRPr lang="en-US"/>
+          </a:p>
+        </p:txBody>
+      </p:sp>
+      <p:sp>
+        <p:nvSpPr>
+          <p:cNvPr id="5" name="Oval 4">
+            <a:extLst>
+              <a:ext uri="{FF2B5EF4-FFF2-40B4-BE49-F238E27FC236}">
+                <a16:creationId xmlns:a16="http://schemas.microsoft.com/office/drawing/2014/main" id="{6DFBB1B4-3BCA-FB91-8115-FF1D652E5CCB}"/>
+              </a:ext>
+            </a:extLst>
+          </p:cNvPr>
+          <p:cNvSpPr/>
+          <p:nvPr/>
+        </p:nvSpPr>
+        <p:spPr>
+          <a:xfrm>
+            <a:off x="1809398" y="3492138"/>
+            <a:ext cx="238137" cy="238137"/>
+          </a:xfrm>
+          <a:prstGeom prst="ellipse">
+            <a:avLst/>
+          </a:prstGeom>
+          <a:solidFill>
+            <a:schemeClr val="accent2">
+              <a:alpha val="25000"/>
+            </a:schemeClr>
+          </a:solidFill>
+          <a:ln>
+            <a:solidFill>
+              <a:schemeClr val="accent2"/>
+            </a:solidFill>
+          </a:ln>
+        </p:spPr>
+        <p:style>
+          <a:lnRef idx="2">
+            <a:schemeClr val="accent1">
+              <a:shade val="50000"/>
+            </a:schemeClr>
+          </a:lnRef>
+          <a:fillRef idx="1">
+            <a:schemeClr val="accent1"/>
+          </a:fillRef>
+          <a:effectRef idx="0">
+            <a:schemeClr val="accent1"/>
+          </a:effectRef>
+          <a:fontRef idx="minor">
+            <a:schemeClr val="lt1"/>
+          </a:fontRef>
+        </p:style>
+        <p:txBody>
+          <a:bodyPr rtlCol="0" anchor="ctr"/>
+          <a:lstStyle/>
+          <a:p>
+            <a:pPr algn="ctr"/>
+            <a:endParaRPr lang="en-US"/>
+          </a:p>
+        </p:txBody>
+      </p:sp>
+      <p:cxnSp>
+        <p:nvCxnSpPr>
+          <p:cNvPr id="6" name="Straight Arrow Connector 5">
+            <a:extLst>
+              <a:ext uri="{FF2B5EF4-FFF2-40B4-BE49-F238E27FC236}">
+                <a16:creationId xmlns:a16="http://schemas.microsoft.com/office/drawing/2014/main" id="{6C6AA44B-F687-D0EC-D181-3605782011CC}"/>
+              </a:ext>
+            </a:extLst>
+          </p:cNvPr>
+          <p:cNvCxnSpPr>
+            <a:cxnSpLocks/>
+          </p:cNvCxnSpPr>
+          <p:nvPr/>
+        </p:nvCxnSpPr>
+        <p:spPr>
+          <a:xfrm flipV="1">
+            <a:off x="1243902" y="3611207"/>
+            <a:ext cx="0" cy="2708167"/>
+          </a:xfrm>
+          <a:prstGeom prst="straightConnector1">
+            <a:avLst/>
+          </a:prstGeom>
+          <a:ln w="12700">
+            <a:solidFill>
+              <a:srgbClr val="C00000"/>
+            </a:solidFill>
+            <a:prstDash val="dash"/>
+            <a:tailEnd type="triangle"/>
+          </a:ln>
+        </p:spPr>
+        <p:style>
+          <a:lnRef idx="1">
+            <a:schemeClr val="accent1"/>
+          </a:lnRef>
+          <a:fillRef idx="0">
+            <a:schemeClr val="accent1"/>
+          </a:fillRef>
+          <a:effectRef idx="0">
+            <a:schemeClr val="accent1"/>
+          </a:effectRef>
+          <a:fontRef idx="minor">
+            <a:schemeClr val="tx1"/>
+          </a:fontRef>
+        </p:style>
+      </p:cxnSp>
+      <p:cxnSp>
+        <p:nvCxnSpPr>
+          <p:cNvPr id="7" name="Straight Arrow Connector 6">
+            <a:extLst>
+              <a:ext uri="{FF2B5EF4-FFF2-40B4-BE49-F238E27FC236}">
+                <a16:creationId xmlns:a16="http://schemas.microsoft.com/office/drawing/2014/main" id="{46193D0A-0DFF-C188-72E3-8DB19EE13F60}"/>
+              </a:ext>
+            </a:extLst>
+          </p:cNvPr>
+          <p:cNvCxnSpPr>
+            <a:cxnSpLocks/>
+          </p:cNvCxnSpPr>
+          <p:nvPr/>
+        </p:nvCxnSpPr>
+        <p:spPr>
+          <a:xfrm flipV="1">
+            <a:off x="1259400" y="3730275"/>
+            <a:ext cx="1290685" cy="2566371"/>
+          </a:xfrm>
+          <a:prstGeom prst="straightConnector1">
+            <a:avLst/>
+          </a:prstGeom>
+          <a:ln w="12700">
+            <a:solidFill>
+              <a:schemeClr val="accent6"/>
+            </a:solidFill>
+            <a:prstDash val="dash"/>
+            <a:tailEnd type="triangle"/>
+          </a:ln>
+        </p:spPr>
+        <p:style>
+          <a:lnRef idx="1">
+            <a:schemeClr val="accent1"/>
+          </a:lnRef>
+          <a:fillRef idx="0">
+            <a:schemeClr val="accent1"/>
+          </a:fillRef>
+          <a:effectRef idx="0">
+            <a:schemeClr val="accent1"/>
+          </a:effectRef>
+          <a:fontRef idx="minor">
+            <a:schemeClr val="tx1"/>
+          </a:fontRef>
+        </p:style>
+      </p:cxnSp>
     </p:spTree>
     <p:extLst>
       <p:ext uri="{BB962C8B-B14F-4D97-AF65-F5344CB8AC3E}">

</xml_diff>

<commit_message>
update tri correct answer for 121_Q3
</commit_message>
<xml_diff>
--- a/ANALYSIS/MAIN/analysis/SGC3A/static/keys/_learn_121.pptx
+++ b/ANALYSIS/MAIN/analysis/SGC3A/static/keys/_learn_121.pptx
@@ -285,7 +285,7 @@
           <a:p>
             <a:fld id="{53779F68-5F10-A14E-84A0-800094737C2F}" type="datetimeFigureOut">
               <a:rPr lang="en-US" smtClean="0"/>
-              <a:t>5/24/22</a:t>
+              <a:t>6/10/22</a:t>
             </a:fld>
             <a:endParaRPr lang="en-US"/>
           </a:p>
@@ -483,7 +483,7 @@
           <a:p>
             <a:fld id="{53779F68-5F10-A14E-84A0-800094737C2F}" type="datetimeFigureOut">
               <a:rPr lang="en-US" smtClean="0"/>
-              <a:t>5/24/22</a:t>
+              <a:t>6/10/22</a:t>
             </a:fld>
             <a:endParaRPr lang="en-US"/>
           </a:p>
@@ -691,7 +691,7 @@
           <a:p>
             <a:fld id="{53779F68-5F10-A14E-84A0-800094737C2F}" type="datetimeFigureOut">
               <a:rPr lang="en-US" smtClean="0"/>
-              <a:t>5/24/22</a:t>
+              <a:t>6/10/22</a:t>
             </a:fld>
             <a:endParaRPr lang="en-US"/>
           </a:p>
@@ -889,7 +889,7 @@
           <a:p>
             <a:fld id="{53779F68-5F10-A14E-84A0-800094737C2F}" type="datetimeFigureOut">
               <a:rPr lang="en-US" smtClean="0"/>
-              <a:t>5/24/22</a:t>
+              <a:t>6/10/22</a:t>
             </a:fld>
             <a:endParaRPr lang="en-US"/>
           </a:p>
@@ -1164,7 +1164,7 @@
           <a:p>
             <a:fld id="{53779F68-5F10-A14E-84A0-800094737C2F}" type="datetimeFigureOut">
               <a:rPr lang="en-US" smtClean="0"/>
-              <a:t>5/24/22</a:t>
+              <a:t>6/10/22</a:t>
             </a:fld>
             <a:endParaRPr lang="en-US"/>
           </a:p>
@@ -1429,7 +1429,7 @@
           <a:p>
             <a:fld id="{53779F68-5F10-A14E-84A0-800094737C2F}" type="datetimeFigureOut">
               <a:rPr lang="en-US" smtClean="0"/>
-              <a:t>5/24/22</a:t>
+              <a:t>6/10/22</a:t>
             </a:fld>
             <a:endParaRPr lang="en-US"/>
           </a:p>
@@ -1841,7 +1841,7 @@
           <a:p>
             <a:fld id="{53779F68-5F10-A14E-84A0-800094737C2F}" type="datetimeFigureOut">
               <a:rPr lang="en-US" smtClean="0"/>
-              <a:t>5/24/22</a:t>
+              <a:t>6/10/22</a:t>
             </a:fld>
             <a:endParaRPr lang="en-US"/>
           </a:p>
@@ -1982,7 +1982,7 @@
           <a:p>
             <a:fld id="{53779F68-5F10-A14E-84A0-800094737C2F}" type="datetimeFigureOut">
               <a:rPr lang="en-US" smtClean="0"/>
-              <a:t>5/24/22</a:t>
+              <a:t>6/10/22</a:t>
             </a:fld>
             <a:endParaRPr lang="en-US"/>
           </a:p>
@@ -2095,7 +2095,7 @@
           <a:p>
             <a:fld id="{53779F68-5F10-A14E-84A0-800094737C2F}" type="datetimeFigureOut">
               <a:rPr lang="en-US" smtClean="0"/>
-              <a:t>5/24/22</a:t>
+              <a:t>6/10/22</a:t>
             </a:fld>
             <a:endParaRPr lang="en-US"/>
           </a:p>
@@ -2406,7 +2406,7 @@
           <a:p>
             <a:fld id="{53779F68-5F10-A14E-84A0-800094737C2F}" type="datetimeFigureOut">
               <a:rPr lang="en-US" smtClean="0"/>
-              <a:t>5/24/22</a:t>
+              <a:t>6/10/22</a:t>
             </a:fld>
             <a:endParaRPr lang="en-US"/>
           </a:p>
@@ -2694,7 +2694,7 @@
           <a:p>
             <a:fld id="{53779F68-5F10-A14E-84A0-800094737C2F}" type="datetimeFigureOut">
               <a:rPr lang="en-US" smtClean="0"/>
-              <a:t>5/24/22</a:t>
+              <a:t>6/10/22</a:t>
             </a:fld>
             <a:endParaRPr lang="en-US"/>
           </a:p>
@@ -2935,7 +2935,7 @@
           <a:p>
             <a:fld id="{53779F68-5F10-A14E-84A0-800094737C2F}" type="datetimeFigureOut">
               <a:rPr lang="en-US" smtClean="0"/>
-              <a:t>5/24/22</a:t>
+              <a:t>6/10/22</a:t>
             </a:fld>
             <a:endParaRPr lang="en-US"/>
           </a:p>
@@ -5073,9 +5073,9 @@
           <p:nvPr/>
         </p:nvCxnSpPr>
         <p:spPr>
-          <a:xfrm flipV="1">
-            <a:off x="9108532" y="237287"/>
-            <a:ext cx="1393944" cy="2771689"/>
+          <a:xfrm>
+            <a:off x="9332592" y="2556969"/>
+            <a:ext cx="220482" cy="476117"/>
           </a:xfrm>
           <a:prstGeom prst="straightConnector1">
             <a:avLst/>
@@ -5263,7 +5263,7 @@
         </p:nvSpPr>
         <p:spPr>
           <a:xfrm>
-            <a:off x="9881654" y="1089372"/>
+            <a:off x="9762503" y="2216538"/>
             <a:ext cx="238137" cy="238137"/>
           </a:xfrm>
           <a:prstGeom prst="ellipse">
@@ -5978,6 +5978,51 @@
           </a:p>
         </p:txBody>
       </p:sp>
+      <p:cxnSp>
+        <p:nvCxnSpPr>
+          <p:cNvPr id="28" name="Straight Arrow Connector 27">
+            <a:extLst>
+              <a:ext uri="{FF2B5EF4-FFF2-40B4-BE49-F238E27FC236}">
+                <a16:creationId xmlns:a16="http://schemas.microsoft.com/office/drawing/2014/main" id="{23029F9D-1BDC-FE44-A9D6-44056FDB607A}"/>
+              </a:ext>
+            </a:extLst>
+          </p:cNvPr>
+          <p:cNvCxnSpPr>
+            <a:cxnSpLocks/>
+          </p:cNvCxnSpPr>
+          <p:nvPr/>
+        </p:nvCxnSpPr>
+        <p:spPr>
+          <a:xfrm flipV="1">
+            <a:off x="9553074" y="294774"/>
+            <a:ext cx="1359568" cy="2715958"/>
+          </a:xfrm>
+          <a:prstGeom prst="straightConnector1">
+            <a:avLst/>
+          </a:prstGeom>
+          <a:ln w="12700">
+            <a:solidFill>
+              <a:schemeClr val="accent6"/>
+            </a:solidFill>
+            <a:prstDash val="dash"/>
+            <a:tailEnd type="triangle"/>
+          </a:ln>
+        </p:spPr>
+        <p:style>
+          <a:lnRef idx="1">
+            <a:schemeClr val="accent1"/>
+          </a:lnRef>
+          <a:fillRef idx="0">
+            <a:schemeClr val="accent1"/>
+          </a:fillRef>
+          <a:effectRef idx="0">
+            <a:schemeClr val="accent1"/>
+          </a:effectRef>
+          <a:fontRef idx="minor">
+            <a:schemeClr val="tx1"/>
+          </a:fontRef>
+        </p:style>
+      </p:cxnSp>
     </p:spTree>
     <p:extLst>
       <p:ext uri="{BB962C8B-B14F-4D97-AF65-F5344CB8AC3E}">

</xml_diff>